<commit_message>
Update TCCC LINQ2 deck
</commit_message>
<xml_diff>
--- a/LINQ2/KDahlby.201010.TCCC.LINQ2.pptx
+++ b/LINQ2/KDahlby.201010.TCCC.LINQ2.pptx
@@ -3499,8 +3499,8 @@
     <dgm:cxn modelId="{DC98AD83-2275-4E06-B5A0-AEF756DEA9DA}" srcId="{C94A2CEC-7E11-44AC-8526-487CB90011C3}" destId="{01D8C8CD-0A23-4376-B320-28C02A5B48DC}" srcOrd="1" destOrd="0" parTransId="{E4795B80-ED44-4153-85DA-DD6E699F301D}" sibTransId="{009515BD-BA36-4CFC-B1E1-89CB29502882}"/>
     <dgm:cxn modelId="{54CFD2D0-8B52-4068-8DE2-D6EE9F4AFF2C}" srcId="{8FF17D92-C556-44EA-BCC4-1A96F0EB144D}" destId="{EEAD1D87-B6A5-4279-AF84-90387BC4CB25}" srcOrd="0" destOrd="0" parTransId="{F8D5B442-BFE8-49F3-8018-DB49C23AF9EC}" sibTransId="{F58080C0-9B68-4872-9815-BDB4899B0BAD}"/>
     <dgm:cxn modelId="{2EA8AFC6-659C-4BEF-BB56-58024B8310C8}" srcId="{C94A2CEC-7E11-44AC-8526-487CB90011C3}" destId="{8D1D09BA-79B7-4BAB-906E-025313904CD2}" srcOrd="2" destOrd="0" parTransId="{598EBDF2-3507-45F8-A17D-6D9C4760DAB8}" sibTransId="{35500048-143B-49EE-AC2B-E8D787B79467}"/>
+    <dgm:cxn modelId="{E2FA981A-CE80-47FE-97AF-38AA5466E07A}" type="presOf" srcId="{0CB5697A-06FB-41AB-B349-9FE9FBADB272}" destId="{018A1D9D-9BE9-4025-BC6D-A48380D0F552}" srcOrd="0" destOrd="5" presId="urn:microsoft.com/office/officeart/2005/8/layout/hList6"/>
     <dgm:cxn modelId="{B6BDB45F-23A7-4FBF-BC74-5C39541DC521}" type="presOf" srcId="{FDF95E3C-6DD2-427D-B55A-226E6A4A9D55}" destId="{F87D1727-4552-4548-8FAB-181A16DF15FD}" srcOrd="0" destOrd="7" presId="urn:microsoft.com/office/officeart/2005/8/layout/hList6"/>
-    <dgm:cxn modelId="{E2FA981A-CE80-47FE-97AF-38AA5466E07A}" type="presOf" srcId="{0CB5697A-06FB-41AB-B349-9FE9FBADB272}" destId="{018A1D9D-9BE9-4025-BC6D-A48380D0F552}" srcOrd="0" destOrd="5" presId="urn:microsoft.com/office/officeart/2005/8/layout/hList6"/>
     <dgm:cxn modelId="{2AD339F9-12C5-47F5-9DEA-2789386E3D03}" srcId="{EEAD1D87-B6A5-4279-AF84-90387BC4CB25}" destId="{59980C8D-4376-4C09-B708-995675AE68C2}" srcOrd="3" destOrd="0" parTransId="{61D38A39-F0E5-4C3E-BEBD-4A9C940E32CA}" sibTransId="{1D94A877-A572-48E9-8CF3-A729D9FFE576}"/>
     <dgm:cxn modelId="{4BD66B8B-5E0B-422F-B1A9-7C4144B7051C}" type="presOf" srcId="{8D1D09BA-79B7-4BAB-906E-025313904CD2}" destId="{018A1D9D-9BE9-4025-BC6D-A48380D0F552}" srcOrd="0" destOrd="3" presId="urn:microsoft.com/office/officeart/2005/8/layout/hList6"/>
     <dgm:cxn modelId="{1BEAEABD-69EE-4D54-BA4D-B4D5DA407FA2}" type="presOf" srcId="{745FDFF7-590A-4F8E-9E81-2F464639268C}" destId="{018A1D9D-9BE9-4025-BC6D-A48380D0F552}" srcOrd="0" destOrd="4" presId="urn:microsoft.com/office/officeart/2005/8/layout/hList6"/>
@@ -9784,7 +9784,7 @@
               <a:pPr>
                 <a:defRPr/>
               </a:pPr>
-              <a:t>10/4/2010</a:t>
+              <a:t>10/9/2010</a:t>
             </a:fld>
             <a:endParaRPr lang="en-US" dirty="0"/>
           </a:p>
@@ -10443,7 +10443,7 @@
     </p:spTree>
     <p:extLst>
       <p:ext uri="{BB962C8B-B14F-4D97-AF65-F5344CB8AC3E}">
-        <p14:creationId xmlns:p14="http://schemas.microsoft.com/office/powerpoint/2010/main" xmlns="" val="946251239"/>
+        <p14:creationId xmlns="" xmlns:p14="http://schemas.microsoft.com/office/powerpoint/2010/main" val="946251239"/>
       </p:ext>
     </p:extLst>
   </p:cSld>
@@ -10698,7 +10698,7 @@
             <a:fld id="{81331B57-0BE5-4F82-AA58-76F53EFF3ADA}" type="datetime8">
               <a:rPr lang="en-US" smtClean="0"/>
               <a:pPr/>
-              <a:t>10/4/2010 11:48 PM</a:t>
+              <a:t>10/9/2010 8:46 AM</a:t>
             </a:fld>
             <a:endParaRPr lang="en-US" dirty="0"/>
           </a:p>
@@ -10979,7 +10979,7 @@
               <a:pPr>
                 <a:defRPr/>
               </a:pPr>
-              <a:t>10/4/2010</a:t>
+              <a:t>10/9/2010</a:t>
             </a:fld>
             <a:endParaRPr lang="en-US"/>
           </a:p>
@@ -11174,7 +11174,7 @@
               <a:pPr>
                 <a:defRPr/>
               </a:pPr>
-              <a:t>10/4/2010</a:t>
+              <a:t>10/9/2010</a:t>
             </a:fld>
             <a:endParaRPr lang="en-US" dirty="0"/>
           </a:p>
@@ -11379,7 +11379,7 @@
               <a:pPr>
                 <a:defRPr/>
               </a:pPr>
-              <a:t>10/4/2010</a:t>
+              <a:t>10/9/2010</a:t>
             </a:fld>
             <a:endParaRPr lang="en-US" dirty="0"/>
           </a:p>
@@ -11614,7 +11614,7 @@
               <a:pPr>
                 <a:defRPr/>
               </a:pPr>
-              <a:t>10/4/2010</a:t>
+              <a:t>10/9/2010</a:t>
             </a:fld>
             <a:endParaRPr lang="en-US" dirty="0"/>
           </a:p>
@@ -11886,7 +11886,7 @@
               <a:pPr>
                 <a:defRPr/>
               </a:pPr>
-              <a:t>10/4/2010</a:t>
+              <a:t>10/9/2010</a:t>
             </a:fld>
             <a:endParaRPr lang="en-US"/>
           </a:p>
@@ -12180,7 +12180,7 @@
               <a:pPr>
                 <a:defRPr/>
               </a:pPr>
-              <a:t>10/4/2010</a:t>
+              <a:t>10/9/2010</a:t>
             </a:fld>
             <a:endParaRPr lang="en-US" dirty="0"/>
           </a:p>
@@ -12588,7 +12588,7 @@
               <a:pPr>
                 <a:defRPr/>
               </a:pPr>
-              <a:t>10/4/2010</a:t>
+              <a:t>10/9/2010</a:t>
             </a:fld>
             <a:endParaRPr lang="en-US" dirty="0"/>
           </a:p>
@@ -12768,7 +12768,7 @@
               <a:pPr>
                 <a:defRPr/>
               </a:pPr>
-              <a:t>10/4/2010</a:t>
+              <a:t>10/9/2010</a:t>
             </a:fld>
             <a:endParaRPr lang="en-US" dirty="0"/>
           </a:p>
@@ -12888,7 +12888,7 @@
               <a:pPr>
                 <a:defRPr/>
               </a:pPr>
-              <a:t>10/4/2010</a:t>
+              <a:t>10/9/2010</a:t>
             </a:fld>
             <a:endParaRPr lang="en-US" dirty="0"/>
           </a:p>
@@ -13179,7 +13179,7 @@
               <a:pPr>
                 <a:defRPr/>
               </a:pPr>
-              <a:t>10/4/2010</a:t>
+              <a:t>10/9/2010</a:t>
             </a:fld>
             <a:endParaRPr lang="en-US" dirty="0"/>
           </a:p>
@@ -13824,7 +13824,7 @@
               <a:pPr>
                 <a:defRPr/>
               </a:pPr>
-              <a:t>10/4/2010</a:t>
+              <a:t>10/9/2010</a:t>
             </a:fld>
             <a:endParaRPr lang="en-US"/>
           </a:p>
@@ -14349,7 +14349,7 @@
               <a:pPr>
                 <a:defRPr/>
               </a:pPr>
-              <a:t>10/4/2010</a:t>
+              <a:t>10/9/2010</a:t>
             </a:fld>
             <a:endParaRPr lang="en-US" dirty="0"/>
           </a:p>
@@ -18135,13 +18135,11 @@
             </a:r>
             <a:r>
               <a:rPr lang="en-US" sz="2000" dirty="0" smtClean="0"/>
-              <a:t> – yields seed as element </a:t>
-            </a:r>
-            <a:r>
-              <a:rPr lang="en-US" sz="2000" dirty="0" smtClean="0">
-                <a:latin typeface="Consolas" pitchFamily="49" charset="0"/>
-              </a:rPr>
-              <a:t>0</a:t>
+              <a:t> – </a:t>
+            </a:r>
+            <a:r>
+              <a:rPr lang="en-US" sz="2000" dirty="0" smtClean="0"/>
+              <a:t>slightly different</a:t>
             </a:r>
             <a:endParaRPr lang="en-US" sz="2200" dirty="0" smtClean="0"/>
           </a:p>
@@ -18917,6 +18915,25 @@
               <a:t>);</a:t>
             </a:r>
           </a:p>
+          <a:p>
+            <a:pPr>
+              <a:buNone/>
+            </a:pPr>
+            <a:endParaRPr lang="en-US" sz="2000" dirty="0" smtClean="0">
+              <a:latin typeface="Consolas" pitchFamily="49" charset="0"/>
+            </a:endParaRPr>
+          </a:p>
+          <a:p>
+            <a:pPr>
+              <a:buNone/>
+            </a:pPr>
+            <a:r>
+              <a:rPr lang="en-US" sz="2000" dirty="0" smtClean="0">
+                <a:latin typeface="Consolas" pitchFamily="49" charset="0"/>
+              </a:rPr>
+              <a:t>// Prints 1, 2, 2, 3, 4, 4, etc</a:t>
+            </a:r>
+          </a:p>
         </p:txBody>
       </p:sp>
     </p:spTree>
@@ -20092,7 +20109,15 @@
             </a:r>
             <a:r>
               <a:rPr lang="en-US" sz="2400" dirty="0" smtClean="0"/>
-              <a:t> that eat errors</a:t>
+              <a:t> that </a:t>
+            </a:r>
+            <a:r>
+              <a:rPr lang="en-US" sz="2400" dirty="0" smtClean="0"/>
+              <a:t>eats </a:t>
+            </a:r>
+            <a:r>
+              <a:rPr lang="en-US" sz="2400" dirty="0" smtClean="0"/>
+              <a:t>errors</a:t>
             </a:r>
           </a:p>
           <a:p>
@@ -21891,8 +21916,14 @@
           <a:p>
             <a:pPr lvl="1"/>
             <a:r>
+              <a:rPr lang="en-US" sz="2000" dirty="0" smtClean="0">
+                <a:latin typeface="Consolas" pitchFamily="49" charset="0"/>
+              </a:rPr>
+              <a:t>Share()</a:t>
+            </a:r>
+            <a:r>
               <a:rPr lang="en-US" sz="2000" dirty="0" smtClean="0"/>
-              <a:t>Share() – Cursor shared between enumerators</a:t>
+              <a:t> – Cursor shared between enumerators</a:t>
             </a:r>
           </a:p>
           <a:p>
@@ -22541,19 +22572,7 @@
             </a:pPr>
             <a:r>
               <a:rPr lang="en-US" sz="2000" dirty="0" smtClean="0"/>
-              <a:t>.NET </a:t>
-            </a:r>
-            <a:r>
-              <a:rPr lang="en-US" sz="2000" dirty="0" smtClean="0"/>
-              <a:t>3.5</a:t>
-            </a:r>
-            <a:r>
-              <a:rPr lang="en-US" sz="2000" dirty="0" smtClean="0"/>
-              <a:t>, </a:t>
-            </a:r>
-            <a:r>
-              <a:rPr lang="en-US" sz="2000" dirty="0" smtClean="0"/>
-              <a:t>.NET 4.0, Silverlight</a:t>
+              <a:t>.NET 3.5, .NET 4.0, Silverlight</a:t>
             </a:r>
           </a:p>
           <a:p>
@@ -22587,7 +22606,7 @@
     </p:custDataLst>
     <p:extLst>
       <p:ext uri="{BB962C8B-B14F-4D97-AF65-F5344CB8AC3E}">
-        <p14:creationId xmlns:p14="http://schemas.microsoft.com/office/powerpoint/2010/main" xmlns="" val="92953621"/>
+        <p14:creationId xmlns="" xmlns:p14="http://schemas.microsoft.com/office/powerpoint/2010/main" val="92953621"/>
       </p:ext>
     </p:extLst>
   </p:cSld>
@@ -23605,7 +23624,7 @@
           <a:blip r:embed="rId4" cstate="print">
             <a:extLst>
               <a:ext uri="{28A0092B-C50C-407E-A947-70E740481C1C}">
-                <a14:useLocalDpi xmlns:a14="http://schemas.microsoft.com/office/drawing/2010/main" xmlns="" val="0"/>
+                <a14:useLocalDpi xmlns="" xmlns:a14="http://schemas.microsoft.com/office/drawing/2010/main" val="0"/>
               </a:ext>
             </a:extLst>
           </a:blip>
@@ -23625,7 +23644,7 @@
           <a:noFill/>
           <a:extLst>
             <a:ext uri="{909E8E84-426E-40DD-AFC4-6F175D3DCCD1}">
-              <a14:hiddenFill xmlns:a14="http://schemas.microsoft.com/office/drawing/2010/main" xmlns="">
+              <a14:hiddenFill xmlns="" xmlns:a14="http://schemas.microsoft.com/office/drawing/2010/main">
                 <a:solidFill>
                   <a:srgbClr val="FFFFFF"/>
                 </a:solidFill>
@@ -23646,7 +23665,7 @@
           <a:blip r:embed="rId5" cstate="print">
             <a:extLst>
               <a:ext uri="{28A0092B-C50C-407E-A947-70E740481C1C}">
-                <a14:useLocalDpi xmlns:a14="http://schemas.microsoft.com/office/drawing/2010/main" xmlns="" val="0"/>
+                <a14:useLocalDpi xmlns="" xmlns:a14="http://schemas.microsoft.com/office/drawing/2010/main" val="0"/>
               </a:ext>
             </a:extLst>
           </a:blip>
@@ -23666,7 +23685,7 @@
           <a:noFill/>
           <a:extLst>
             <a:ext uri="{909E8E84-426E-40DD-AFC4-6F175D3DCCD1}">
-              <a14:hiddenFill xmlns:a14="http://schemas.microsoft.com/office/drawing/2010/main" xmlns="">
+              <a14:hiddenFill xmlns="" xmlns:a14="http://schemas.microsoft.com/office/drawing/2010/main">
                 <a:solidFill>
                   <a:srgbClr val="FFFFFF"/>
                 </a:solidFill>

</xml_diff>